<commit_message>
[REL] Ready for v3.5.0
Signed-off-by: Jay Heng <hengjie1989@foxmail.com>
</commit_message>
<xml_diff>
--- a/img/RTxxx/i.MX RT image layout.pptx
+++ b/img/RTxxx/i.MX RT image layout.pptx
@@ -3,16 +3,16 @@
 <p:presentation xmlns:a="http://schemas.openxmlformats.org/drawingml/2006/main" xmlns:r="http://schemas.openxmlformats.org/officeDocument/2006/relationships" xmlns:p="http://schemas.openxmlformats.org/presentationml/2006/main" firstSlideNum="0">
   <p:sldMasterIdLst>
     <p:sldMasterId id="2147483648" r:id="rId1"/>
-    <p:sldMasterId id="2147483666" r:id="rId3"/>
+    <p:sldMasterId id="2147483666" r:id="rId2"/>
   </p:sldMasterIdLst>
   <p:notesMasterIdLst>
-    <p:notesMasterId r:id="rId5"/>
+    <p:notesMasterId r:id="rId4"/>
   </p:notesMasterIdLst>
   <p:handoutMasterIdLst>
-    <p:handoutMasterId r:id="rId6"/>
+    <p:handoutMasterId r:id="rId5"/>
   </p:handoutMasterIdLst>
   <p:sldIdLst>
-    <p:sldId id="637" r:id="rId4"/>
+    <p:sldId id="637" r:id="rId3"/>
   </p:sldIdLst>
   <p:sldSz cx="12192000" cy="6858000"/>
   <p:notesSz cx="7315200" cy="9601200"/>
@@ -141,6 +141,36 @@
       </a:defRPr>
     </a:lvl9pPr>
   </p:defaultTextStyle>
+  <p:extLst>
+    <p:ext uri="{EFAFB233-063F-42B5-8137-9DF3F51BA10A}">
+      <p15:sldGuideLst xmlns:p15="http://schemas.microsoft.com/office/powerpoint/2012/main">
+        <p15:guide id="1" orient="horz" pos="2177">
+          <p15:clr>
+            <a:srgbClr val="A4A3A4"/>
+          </p15:clr>
+        </p15:guide>
+        <p15:guide id="2" pos="3815">
+          <p15:clr>
+            <a:srgbClr val="A4A3A4"/>
+          </p15:clr>
+        </p15:guide>
+      </p15:sldGuideLst>
+    </p:ext>
+    <p:ext uri="{2D200454-40CA-4A62-9FC3-DE9A4176ACB9}">
+      <p15:notesGuideLst xmlns:p15="http://schemas.microsoft.com/office/powerpoint/2012/main">
+        <p15:guide id="1" orient="horz" pos="3047">
+          <p15:clr>
+            <a:srgbClr val="A4A3A4"/>
+          </p15:clr>
+        </p15:guide>
+        <p15:guide id="2" pos="2289">
+          <p15:clr>
+            <a:srgbClr val="A4A3A4"/>
+          </p15:clr>
+        </p15:guide>
+      </p15:notesGuideLst>
+    </p:ext>
+  </p:extLst>
 </p:presentation>
 </file>
 
@@ -218,6 +248,7 @@
                   </a:schemeClr>
                 </a:solidFill>
               </a:rPr>
+              <a:t>3/16/2022 7:06:03 PM</a:t>
             </a:fld>
             <a:endParaRPr lang="en-US" sz="900" dirty="0">
               <a:solidFill>
@@ -274,14 +305,6 @@
               </a:rPr>
               <a:t>Confidential and Proprietary, © NXP</a:t>
             </a:r>
-            <a:endParaRPr lang="en-US" sz="900" dirty="0">
-              <a:solidFill>
-                <a:schemeClr val="tx1">
-                  <a:lumMod val="75000"/>
-                  <a:lumOff val="25000"/>
-                </a:schemeClr>
-              </a:solidFill>
-            </a:endParaRPr>
           </a:p>
         </p:txBody>
       </p:sp>
@@ -327,6 +350,7 @@
                   </a:schemeClr>
                 </a:solidFill>
               </a:rPr>
+              <a:t>‹#›</a:t>
             </a:fld>
             <a:endParaRPr lang="en-US" sz="1000" dirty="0">
               <a:solidFill>
@@ -1248,6 +1272,11 @@
         </p:sp>
       </p:grpSp>
     </p:spTree>
+    <p:extLst>
+      <p:ext uri="{BB962C8B-B14F-4D97-AF65-F5344CB8AC3E}">
+        <p14:creationId xmlns:p14="http://schemas.microsoft.com/office/powerpoint/2010/main" val="1"/>
+      </p:ext>
+    </p:extLst>
   </p:cSld>
   <p:clrMap bg1="lt1" tx1="dk1" bg2="lt2" tx2="dk2" accent1="accent1" accent2="accent2" accent3="accent3" accent4="accent4" accent5="accent5" accent6="accent6" hlink="hlink" folHlink="folHlink"/>
 </p:handoutMaster>
@@ -1340,7 +1369,6 @@
               <a:rPr lang="en-US"/>
               <a:t>Click to edit Master text styles</a:t>
             </a:r>
-            <a:endParaRPr lang="en-US"/>
           </a:p>
           <a:p>
             <a:pPr lvl="1"/>
@@ -1348,7 +1376,6 @@
               <a:rPr lang="en-US"/>
               <a:t>Second level</a:t>
             </a:r>
-            <a:endParaRPr lang="en-US"/>
           </a:p>
           <a:p>
             <a:pPr lvl="2"/>
@@ -1356,7 +1383,6 @@
               <a:rPr lang="en-US"/>
               <a:t>Third level</a:t>
             </a:r>
-            <a:endParaRPr lang="en-US"/>
           </a:p>
           <a:p>
             <a:pPr lvl="3"/>
@@ -1364,7 +1390,6 @@
               <a:rPr lang="en-US"/>
               <a:t>Fourth level</a:t>
             </a:r>
-            <a:endParaRPr lang="en-US"/>
           </a:p>
           <a:p>
             <a:pPr lvl="4"/>
@@ -1372,7 +1397,6 @@
               <a:rPr lang="en-US"/>
               <a:t>Fifth level</a:t>
             </a:r>
-            <a:endParaRPr lang="en-US"/>
           </a:p>
         </p:txBody>
       </p:sp>
@@ -1419,6 +1443,7 @@
                   </a:schemeClr>
                 </a:solidFill>
               </a:rPr>
+              <a:t>3/16/2022 7:06:03 PM</a:t>
             </a:fld>
             <a:endParaRPr lang="en-US" sz="900" dirty="0">
               <a:solidFill>
@@ -1475,14 +1500,6 @@
               </a:rPr>
               <a:t>Confidential and Proprietary, © NXP</a:t>
             </a:r>
-            <a:endParaRPr lang="en-US" sz="900" dirty="0">
-              <a:solidFill>
-                <a:schemeClr val="tx1">
-                  <a:lumMod val="75000"/>
-                  <a:lumOff val="25000"/>
-                </a:schemeClr>
-              </a:solidFill>
-            </a:endParaRPr>
           </a:p>
         </p:txBody>
       </p:sp>
@@ -1528,6 +1545,7 @@
                   </a:schemeClr>
                 </a:solidFill>
               </a:rPr>
+              <a:t>‹#›</a:t>
             </a:fld>
             <a:endParaRPr lang="en-US" sz="1000" dirty="0">
               <a:solidFill>
@@ -2577,7 +2595,7 @@
 </file>
 
 <file path=ppt/slideLayouts/slideLayout1.xml><?xml version="1.0" encoding="utf-8"?>
-<p:sldLayout xmlns:a="http://schemas.openxmlformats.org/drawingml/2006/main" xmlns:r="http://schemas.openxmlformats.org/officeDocument/2006/relationships" xmlns:p="http://schemas.openxmlformats.org/presentationml/2006/main" preserve="1" showMasterSp="0" userDrawn="1">
+<p:sldLayout xmlns:a="http://schemas.openxmlformats.org/drawingml/2006/main" xmlns:r="http://schemas.openxmlformats.org/officeDocument/2006/relationships" xmlns:p="http://schemas.openxmlformats.org/presentationml/2006/main" showMasterSp="0" preserve="1" userDrawn="1">
   <p:cSld name="02_Master Title Slide">
     <p:spTree>
       <p:nvGrpSpPr>
@@ -2656,7 +2674,6 @@
               <a:rPr lang="en-US" dirty="0"/>
               <a:t>Click to edit Master text styles</a:t>
             </a:r>
-            <a:endParaRPr lang="en-US" dirty="0"/>
           </a:p>
         </p:txBody>
       </p:sp>
@@ -2718,7 +2735,6 @@
               <a:rPr lang="en-US" dirty="0"/>
               <a:t>Click to edit Master text styles</a:t>
             </a:r>
-            <a:endParaRPr lang="en-US" dirty="0"/>
           </a:p>
         </p:txBody>
       </p:sp>
@@ -2775,7 +2791,6 @@
               <a:rPr lang="en-US" dirty="0"/>
               <a:t>Second Line Optional</a:t>
             </a:r>
-            <a:endParaRPr lang="en-US" dirty="0"/>
           </a:p>
         </p:txBody>
       </p:sp>
@@ -2843,14 +2858,6 @@
               </a:rPr>
               <a:t>CONFIDENTIAL AND PROPRIETARY</a:t>
             </a:r>
-            <a:endParaRPr lang="en-US" sz="1300" b="0" i="0" cap="all" baseline="0" dirty="0">
-              <a:solidFill>
-                <a:schemeClr val="tx1">
-                  <a:lumMod val="50000"/>
-                  <a:lumOff val="50000"/>
-                </a:schemeClr>
-              </a:solidFill>
-            </a:endParaRPr>
           </a:p>
         </p:txBody>
       </p:sp>
@@ -12082,7 +12089,6 @@
               <a:rPr lang="en-US" dirty="0"/>
               <a:t>Click to Add Chart</a:t>
             </a:r>
-            <a:endParaRPr lang="en-US" dirty="0"/>
           </a:p>
         </p:txBody>
       </p:sp>
@@ -12130,7 +12136,6 @@
               <a:rPr lang="en-US" dirty="0"/>
               <a:t>Title Goes Here</a:t>
             </a:r>
-            <a:endParaRPr lang="en-US" dirty="0"/>
           </a:p>
         </p:txBody>
       </p:sp>
@@ -12252,7 +12257,6 @@
               <a:rPr lang="en-US" dirty="0"/>
               <a:t>Click to edit master title style</a:t>
             </a:r>
-            <a:endParaRPr lang="en-US" dirty="0"/>
           </a:p>
         </p:txBody>
       </p:sp>
@@ -13349,7 +13353,6 @@
               <a:rPr lang="en-US" dirty="0"/>
               <a:t>Click to edit master title style</a:t>
             </a:r>
-            <a:endParaRPr lang="en-US" dirty="0"/>
           </a:p>
         </p:txBody>
       </p:sp>
@@ -14446,7 +14449,6 @@
               <a:rPr lang="en-US" dirty="0"/>
               <a:t>Click to edit master title style</a:t>
             </a:r>
-            <a:endParaRPr lang="en-US" dirty="0"/>
           </a:p>
         </p:txBody>
       </p:sp>
@@ -15543,7 +15545,6 @@
               <a:rPr lang="en-US" dirty="0"/>
               <a:t>Click to edit master title style</a:t>
             </a:r>
-            <a:endParaRPr lang="en-US" dirty="0"/>
           </a:p>
         </p:txBody>
       </p:sp>
@@ -16640,7 +16641,6 @@
               <a:rPr lang="en-US" dirty="0"/>
               <a:t>Click to edit master title style</a:t>
             </a:r>
-            <a:endParaRPr lang="en-US" dirty="0"/>
           </a:p>
         </p:txBody>
       </p:sp>
@@ -17737,7 +17737,6 @@
               <a:rPr lang="en-US" dirty="0"/>
               <a:t>Click to edit master title style</a:t>
             </a:r>
-            <a:endParaRPr lang="en-US" dirty="0"/>
           </a:p>
         </p:txBody>
       </p:sp>
@@ -18778,7 +18777,6 @@
               <a:rPr lang="en-US" dirty="0"/>
               <a:t>Title Goes Here</a:t>
             </a:r>
-            <a:endParaRPr lang="en-US" dirty="0"/>
           </a:p>
         </p:txBody>
       </p:sp>
@@ -18807,7 +18805,6 @@
               <a:rPr lang="en-US" dirty="0"/>
               <a:t>Click to edit Master text styles</a:t>
             </a:r>
-            <a:endParaRPr lang="en-US" dirty="0"/>
           </a:p>
           <a:p>
             <a:pPr lvl="1"/>
@@ -18815,7 +18812,6 @@
               <a:rPr lang="en-US" dirty="0"/>
               <a:t>Second level</a:t>
             </a:r>
-            <a:endParaRPr lang="en-US" dirty="0"/>
           </a:p>
           <a:p>
             <a:pPr lvl="2"/>
@@ -18823,7 +18819,6 @@
               <a:rPr lang="en-US" dirty="0"/>
               <a:t>Third level</a:t>
             </a:r>
-            <a:endParaRPr lang="en-US" dirty="0"/>
           </a:p>
           <a:p>
             <a:pPr lvl="3"/>
@@ -18831,7 +18826,6 @@
               <a:rPr lang="en-US" dirty="0"/>
               <a:t>Fourth level</a:t>
             </a:r>
-            <a:endParaRPr lang="en-US" dirty="0"/>
           </a:p>
           <a:p>
             <a:pPr lvl="4"/>
@@ -18839,7 +18833,6 @@
               <a:rPr lang="en-US" dirty="0"/>
               <a:t>Fifth level</a:t>
             </a:r>
-            <a:endParaRPr lang="en-US" dirty="0"/>
           </a:p>
         </p:txBody>
       </p:sp>
@@ -18883,7 +18876,7 @@
 </file>
 
 <file path=ppt/slideLayouts/slideLayout2.xml><?xml version="1.0" encoding="utf-8"?>
-<p:sldLayout xmlns:a="http://schemas.openxmlformats.org/drawingml/2006/main" xmlns:r="http://schemas.openxmlformats.org/officeDocument/2006/relationships" xmlns:p="http://schemas.openxmlformats.org/presentationml/2006/main" preserve="1" showMasterSp="0" userDrawn="1">
+<p:sldLayout xmlns:a="http://schemas.openxmlformats.org/drawingml/2006/main" xmlns:r="http://schemas.openxmlformats.org/officeDocument/2006/relationships" xmlns:p="http://schemas.openxmlformats.org/presentationml/2006/main" showMasterSp="0" preserve="1" userDrawn="1">
   <p:cSld name="3_Master Title Slide">
     <p:spTree>
       <p:nvGrpSpPr>
@@ -18933,7 +18926,6 @@
               <a:rPr lang="en-US" dirty="0"/>
               <a:t>Click to Insert Full Image</a:t>
             </a:r>
-            <a:endParaRPr lang="en-US" dirty="0"/>
           </a:p>
         </p:txBody>
       </p:sp>
@@ -19046,7 +19038,6 @@
               <a:rPr lang="en-US" dirty="0"/>
               <a:t>Click to edit Master text styles</a:t>
             </a:r>
-            <a:endParaRPr lang="en-US" dirty="0"/>
           </a:p>
         </p:txBody>
       </p:sp>
@@ -19101,7 +19092,6 @@
               <a:rPr lang="en-US" dirty="0"/>
               <a:t>Second Line Optional</a:t>
             </a:r>
-            <a:endParaRPr lang="en-US" dirty="0"/>
           </a:p>
         </p:txBody>
       </p:sp>
@@ -19203,11 +19193,6 @@
               </a:rPr>
               <a:t>CONFIDENTIAL AND PROPRIETARY</a:t>
             </a:r>
-            <a:endParaRPr lang="en-US" sz="1300" b="0" i="0" cap="all" baseline="0" dirty="0">
-              <a:solidFill>
-                <a:schemeClr val="bg1"/>
-              </a:solidFill>
-            </a:endParaRPr>
           </a:p>
         </p:txBody>
       </p:sp>
@@ -19361,6 +19346,7 @@
                   <a:schemeClr val="bg1"/>
                 </a:solidFill>
               </a:rPr>
+              <a:t>‹#›</a:t>
             </a:fld>
             <a:endParaRPr lang="en-US" sz="1300" b="0" dirty="0">
               <a:solidFill>
@@ -28612,7 +28598,6 @@
               <a:rPr lang="en-US" dirty="0"/>
               <a:t>Title Goes Here</a:t>
             </a:r>
-            <a:endParaRPr lang="en-US" dirty="0"/>
           </a:p>
         </p:txBody>
       </p:sp>
@@ -28641,7 +28626,6 @@
               <a:rPr lang="en-US" dirty="0"/>
               <a:t>Click to edit Master text styles</a:t>
             </a:r>
-            <a:endParaRPr lang="en-US" dirty="0"/>
           </a:p>
           <a:p>
             <a:pPr lvl="1"/>
@@ -28649,7 +28633,6 @@
               <a:rPr lang="en-US" dirty="0"/>
               <a:t>Second level</a:t>
             </a:r>
-            <a:endParaRPr lang="en-US" dirty="0"/>
           </a:p>
           <a:p>
             <a:pPr lvl="2"/>
@@ -28657,7 +28640,6 @@
               <a:rPr lang="en-US" dirty="0"/>
               <a:t>Third level</a:t>
             </a:r>
-            <a:endParaRPr lang="en-US" dirty="0"/>
           </a:p>
           <a:p>
             <a:pPr lvl="3"/>
@@ -28665,7 +28647,6 @@
               <a:rPr lang="en-US" dirty="0"/>
               <a:t>Fourth level</a:t>
             </a:r>
-            <a:endParaRPr lang="en-US" dirty="0"/>
           </a:p>
           <a:p>
             <a:pPr lvl="4"/>
@@ -28673,7 +28654,6 @@
               <a:rPr lang="en-US" dirty="0"/>
               <a:t>Fifth level</a:t>
             </a:r>
-            <a:endParaRPr lang="en-US" dirty="0"/>
           </a:p>
         </p:txBody>
       </p:sp>
@@ -28749,7 +28729,6 @@
               <a:rPr lang="en-US" dirty="0"/>
               <a:t>Title Goes Here</a:t>
             </a:r>
-            <a:endParaRPr lang="en-US" dirty="0"/>
           </a:p>
         </p:txBody>
       </p:sp>
@@ -28778,7 +28757,6 @@
               <a:rPr lang="en-US" dirty="0"/>
               <a:t>Click to edit Master text styles</a:t>
             </a:r>
-            <a:endParaRPr lang="en-US" dirty="0"/>
           </a:p>
           <a:p>
             <a:pPr lvl="1"/>
@@ -28786,7 +28764,6 @@
               <a:rPr lang="en-US" dirty="0"/>
               <a:t>Second level</a:t>
             </a:r>
-            <a:endParaRPr lang="en-US" dirty="0"/>
           </a:p>
           <a:p>
             <a:pPr lvl="2"/>
@@ -28794,7 +28771,6 @@
               <a:rPr lang="en-US" dirty="0"/>
               <a:t>Third level</a:t>
             </a:r>
-            <a:endParaRPr lang="en-US" dirty="0"/>
           </a:p>
           <a:p>
             <a:pPr lvl="3"/>
@@ -28802,7 +28778,6 @@
               <a:rPr lang="en-US" dirty="0"/>
               <a:t>Fourth level</a:t>
             </a:r>
-            <a:endParaRPr lang="en-US" dirty="0"/>
           </a:p>
           <a:p>
             <a:pPr lvl="4"/>
@@ -28810,7 +28785,6 @@
               <a:rPr lang="en-US" dirty="0"/>
               <a:t>Fifth level</a:t>
             </a:r>
-            <a:endParaRPr lang="en-US" dirty="0"/>
           </a:p>
         </p:txBody>
       </p:sp>
@@ -28839,7 +28813,6 @@
               <a:rPr lang="en-US" dirty="0"/>
               <a:t>Click to edit Master text styles</a:t>
             </a:r>
-            <a:endParaRPr lang="en-US" dirty="0"/>
           </a:p>
           <a:p>
             <a:pPr lvl="1"/>
@@ -28847,7 +28820,6 @@
               <a:rPr lang="en-US" dirty="0"/>
               <a:t>Second level</a:t>
             </a:r>
-            <a:endParaRPr lang="en-US" dirty="0"/>
           </a:p>
           <a:p>
             <a:pPr lvl="2"/>
@@ -28855,7 +28827,6 @@
               <a:rPr lang="en-US" dirty="0"/>
               <a:t>Third level</a:t>
             </a:r>
-            <a:endParaRPr lang="en-US" dirty="0"/>
           </a:p>
           <a:p>
             <a:pPr lvl="3"/>
@@ -28863,7 +28834,6 @@
               <a:rPr lang="en-US" dirty="0"/>
               <a:t>Fourth level</a:t>
             </a:r>
-            <a:endParaRPr lang="en-US" dirty="0"/>
           </a:p>
           <a:p>
             <a:pPr lvl="4"/>
@@ -28871,7 +28841,6 @@
               <a:rPr lang="en-US" dirty="0"/>
               <a:t>Fifth level</a:t>
             </a:r>
-            <a:endParaRPr lang="en-US" dirty="0"/>
           </a:p>
         </p:txBody>
       </p:sp>
@@ -28947,7 +28916,6 @@
               <a:rPr lang="en-US" dirty="0"/>
               <a:t>Title Goes Here</a:t>
             </a:r>
-            <a:endParaRPr lang="en-US" dirty="0"/>
           </a:p>
         </p:txBody>
       </p:sp>
@@ -28976,7 +28944,6 @@
               <a:rPr lang="en-US" dirty="0"/>
               <a:t>Click to edit Master text styles</a:t>
             </a:r>
-            <a:endParaRPr lang="en-US" dirty="0"/>
           </a:p>
           <a:p>
             <a:pPr lvl="1"/>
@@ -28984,7 +28951,6 @@
               <a:rPr lang="en-US" dirty="0"/>
               <a:t>Second level</a:t>
             </a:r>
-            <a:endParaRPr lang="en-US" dirty="0"/>
           </a:p>
           <a:p>
             <a:pPr lvl="2"/>
@@ -28992,7 +28958,6 @@
               <a:rPr lang="en-US" dirty="0"/>
               <a:t>Third level</a:t>
             </a:r>
-            <a:endParaRPr lang="en-US" dirty="0"/>
           </a:p>
           <a:p>
             <a:pPr lvl="3"/>
@@ -29000,7 +28965,6 @@
               <a:rPr lang="en-US" dirty="0"/>
               <a:t>Fourth level</a:t>
             </a:r>
-            <a:endParaRPr lang="en-US" dirty="0"/>
           </a:p>
           <a:p>
             <a:pPr lvl="4"/>
@@ -29008,7 +28972,6 @@
               <a:rPr lang="en-US" dirty="0"/>
               <a:t>Fifth level</a:t>
             </a:r>
-            <a:endParaRPr lang="en-US" dirty="0"/>
           </a:p>
         </p:txBody>
       </p:sp>
@@ -29037,7 +29000,6 @@
               <a:rPr lang="en-US" dirty="0"/>
               <a:t>Click to edit Master text styles</a:t>
             </a:r>
-            <a:endParaRPr lang="en-US" dirty="0"/>
           </a:p>
           <a:p>
             <a:pPr lvl="1"/>
@@ -29045,7 +29007,6 @@
               <a:rPr lang="en-US" dirty="0"/>
               <a:t>Second level</a:t>
             </a:r>
-            <a:endParaRPr lang="en-US" dirty="0"/>
           </a:p>
           <a:p>
             <a:pPr lvl="2"/>
@@ -29053,7 +29014,6 @@
               <a:rPr lang="en-US" dirty="0"/>
               <a:t>Third level</a:t>
             </a:r>
-            <a:endParaRPr lang="en-US" dirty="0"/>
           </a:p>
           <a:p>
             <a:pPr lvl="3"/>
@@ -29061,7 +29021,6 @@
               <a:rPr lang="en-US" dirty="0"/>
               <a:t>Fourth level</a:t>
             </a:r>
-            <a:endParaRPr lang="en-US" dirty="0"/>
           </a:p>
           <a:p>
             <a:pPr lvl="4"/>
@@ -29069,7 +29028,6 @@
               <a:rPr lang="en-US" dirty="0"/>
               <a:t>Fifth level</a:t>
             </a:r>
-            <a:endParaRPr lang="en-US" dirty="0"/>
           </a:p>
         </p:txBody>
       </p:sp>
@@ -29126,7 +29084,6 @@
               <a:rPr lang="en-US" dirty="0"/>
               <a:t>Click to edit Master text styles</a:t>
             </a:r>
-            <a:endParaRPr lang="en-US" dirty="0"/>
           </a:p>
         </p:txBody>
       </p:sp>
@@ -29183,7 +29140,6 @@
               <a:rPr lang="en-US" dirty="0"/>
               <a:t>Click to edit Master text styles</a:t>
             </a:r>
-            <a:endParaRPr lang="en-US" dirty="0"/>
           </a:p>
         </p:txBody>
       </p:sp>
@@ -29259,7 +29215,6 @@
               <a:rPr lang="en-US" dirty="0"/>
               <a:t>Title Goes Here</a:t>
             </a:r>
-            <a:endParaRPr lang="en-US" dirty="0"/>
           </a:p>
         </p:txBody>
       </p:sp>
@@ -29288,7 +29243,6 @@
               <a:rPr lang="en-US" dirty="0"/>
               <a:t>Click to edit Master text styles</a:t>
             </a:r>
-            <a:endParaRPr lang="en-US" dirty="0"/>
           </a:p>
           <a:p>
             <a:pPr lvl="1"/>
@@ -29296,7 +29250,6 @@
               <a:rPr lang="en-US" dirty="0"/>
               <a:t>Second level</a:t>
             </a:r>
-            <a:endParaRPr lang="en-US" dirty="0"/>
           </a:p>
           <a:p>
             <a:pPr lvl="2"/>
@@ -29304,7 +29257,6 @@
               <a:rPr lang="en-US" dirty="0"/>
               <a:t>Third level</a:t>
             </a:r>
-            <a:endParaRPr lang="en-US" dirty="0"/>
           </a:p>
           <a:p>
             <a:pPr lvl="3"/>
@@ -29312,7 +29264,6 @@
               <a:rPr lang="en-US" dirty="0"/>
               <a:t>Fourth level</a:t>
             </a:r>
-            <a:endParaRPr lang="en-US" dirty="0"/>
           </a:p>
           <a:p>
             <a:pPr lvl="4"/>
@@ -29320,7 +29271,6 @@
               <a:rPr lang="en-US" dirty="0"/>
               <a:t>Fifth level</a:t>
             </a:r>
-            <a:endParaRPr lang="en-US" dirty="0"/>
           </a:p>
         </p:txBody>
       </p:sp>
@@ -29365,6 +29315,7 @@
           <a:p>
             <a:fld id="{3BDFDD5F-E85B-4DA3-A4F9-9CF3C7409943}" type="datetime4">
               <a:rPr lang="en-US" smtClean="0"/>
+              <a:t>March 16, 2022</a:t>
             </a:fld>
             <a:endParaRPr lang="en-US" dirty="0"/>
           </a:p>
@@ -29450,7 +29401,6 @@
               <a:rPr lang="en-US" dirty="0"/>
               <a:t>Click to Insert Picture</a:t>
             </a:r>
-            <a:endParaRPr lang="en-US" dirty="0"/>
           </a:p>
         </p:txBody>
       </p:sp>
@@ -29526,7 +29476,6 @@
               <a:rPr lang="en-US" dirty="0"/>
               <a:t>Title Goes Here</a:t>
             </a:r>
-            <a:endParaRPr lang="en-US" dirty="0"/>
           </a:p>
         </p:txBody>
       </p:sp>
@@ -29630,7 +29579,6 @@
               <a:rPr lang="en-US" dirty="0"/>
               <a:t>Title Goes Here</a:t>
             </a:r>
-            <a:endParaRPr lang="en-US" dirty="0"/>
           </a:p>
         </p:txBody>
       </p:sp>
@@ -29664,7 +29612,6 @@
               <a:rPr lang="en-US" dirty="0"/>
               <a:t>Click to Add Table</a:t>
             </a:r>
-            <a:endParaRPr lang="en-US" dirty="0"/>
           </a:p>
         </p:txBody>
       </p:sp>
@@ -29738,7 +29685,6 @@
               <a:rPr lang="en-US" dirty="0"/>
               <a:t>Title Goes Here</a:t>
             </a:r>
-            <a:endParaRPr lang="en-US" dirty="0"/>
           </a:p>
         </p:txBody>
       </p:sp>
@@ -29772,7 +29718,6 @@
               <a:rPr lang="en-US" dirty="0"/>
               <a:t>Click to edit Master text styles</a:t>
             </a:r>
-            <a:endParaRPr lang="en-US" dirty="0"/>
           </a:p>
           <a:p>
             <a:pPr lvl="1"/>
@@ -29780,7 +29725,6 @@
               <a:rPr lang="en-US" dirty="0"/>
               <a:t>Second level</a:t>
             </a:r>
-            <a:endParaRPr lang="en-US" dirty="0"/>
           </a:p>
           <a:p>
             <a:pPr lvl="2"/>
@@ -29788,7 +29732,6 @@
               <a:rPr lang="en-US" dirty="0"/>
               <a:t>Third level</a:t>
             </a:r>
-            <a:endParaRPr lang="en-US" dirty="0"/>
           </a:p>
           <a:p>
             <a:pPr lvl="3"/>
@@ -29796,7 +29739,6 @@
               <a:rPr lang="en-US" dirty="0"/>
               <a:t>Fourth level</a:t>
             </a:r>
-            <a:endParaRPr lang="en-US" dirty="0"/>
           </a:p>
           <a:p>
             <a:pPr lvl="4"/>
@@ -29804,7 +29746,6 @@
               <a:rPr lang="en-US" dirty="0"/>
               <a:t>Fifth level</a:t>
             </a:r>
-            <a:endParaRPr lang="en-US" dirty="0"/>
           </a:p>
         </p:txBody>
       </p:sp>
@@ -29842,14 +29783,6 @@
               </a:rPr>
               <a:t>CONFIDENTIAL AND PROPRIETARY</a:t>
             </a:r>
-            <a:endParaRPr lang="en-US" sz="1300" b="0" i="0" cap="all" baseline="0" dirty="0">
-              <a:solidFill>
-                <a:schemeClr val="tx1">
-                  <a:lumMod val="50000"/>
-                  <a:lumOff val="50000"/>
-                </a:schemeClr>
-              </a:solidFill>
-            </a:endParaRPr>
           </a:p>
         </p:txBody>
       </p:sp>
@@ -30006,6 +29939,7 @@
                   </a:schemeClr>
                 </a:solidFill>
               </a:rPr>
+              <a:t>‹#›</a:t>
             </a:fld>
             <a:endParaRPr lang="en-US" sz="1300" b="0" dirty="0">
               <a:solidFill>
@@ -41147,9 +41081,6 @@
               </a:rPr>
               <a:t>Application Image</a:t>
             </a:r>
-            <a:endParaRPr lang="en-US" sz="1400" dirty="0">
-              <a:sym typeface="+mn-ea"/>
-            </a:endParaRPr>
           </a:p>
           <a:p>
             <a:pPr algn="ctr"/>
@@ -41163,7 +41094,6 @@
               <a:rPr lang="en-US" sz="1400" dirty="0"/>
               <a:t>Plaintext with CRC</a:t>
             </a:r>
-            <a:endParaRPr lang="en-US" sz="1400" dirty="0"/>
           </a:p>
         </p:txBody>
       </p:sp>
@@ -41194,13 +41124,234 @@
           <a:bodyPr wrap="square" rtlCol="0">
             <a:spAutoFit/>
           </a:bodyPr>
+          <a:lstStyle/>
           <a:p>
             <a:pPr algn="ctr"/>
             <a:r>
               <a:rPr lang="en-US" sz="1200" dirty="0"/>
               <a:t>Flash Device Config Block (FDCB)</a:t>
             </a:r>
-            <a:endParaRPr lang="en-US" sz="1200" dirty="0"/>
+          </a:p>
+        </p:txBody>
+      </p:sp>
+      <p:grpSp>
+        <p:nvGrpSpPr>
+          <p:cNvPr id="7" name="Group 72">
+            <a:extLst>
+              <a:ext uri="{FF2B5EF4-FFF2-40B4-BE49-F238E27FC236}">
+                <a16:creationId xmlns:a16="http://schemas.microsoft.com/office/drawing/2014/main" id="{A58E488C-3FE9-4A90-BBB7-22E4AEC2047B}"/>
+              </a:ext>
+            </a:extLst>
+          </p:cNvPr>
+          <p:cNvGrpSpPr/>
+          <p:nvPr/>
+        </p:nvGrpSpPr>
+        <p:grpSpPr>
+          <a:xfrm>
+            <a:off x="4537756" y="578460"/>
+            <a:ext cx="2877185" cy="4989882"/>
+            <a:chOff x="-1039352" y="-84240"/>
+            <a:chExt cx="2877185" cy="4584065"/>
+          </a:xfrm>
+        </p:grpSpPr>
+        <p:cxnSp>
+          <p:nvCxnSpPr>
+            <p:cNvPr id="8" name="Straight Connector 7">
+              <a:extLst>
+                <a:ext uri="{FF2B5EF4-FFF2-40B4-BE49-F238E27FC236}">
+                  <a16:creationId xmlns:a16="http://schemas.microsoft.com/office/drawing/2014/main" id="{50478B49-7D94-45D1-B6A2-B08FA8D96B99}"/>
+                </a:ext>
+              </a:extLst>
+            </p:cNvPr>
+            <p:cNvCxnSpPr/>
+            <p:nvPr/>
+          </p:nvCxnSpPr>
+          <p:spPr>
+            <a:xfrm rot="5400000" flipH="1" flipV="1">
+              <a:off x="-1036714" y="2136842"/>
+              <a:ext cx="0" cy="0"/>
+            </a:xfrm>
+            <a:prstGeom prst="line">
+              <a:avLst/>
+            </a:prstGeom>
+          </p:spPr>
+          <p:style>
+            <a:lnRef idx="1">
+              <a:schemeClr val="accent1"/>
+            </a:lnRef>
+            <a:fillRef idx="0">
+              <a:schemeClr val="accent1"/>
+            </a:fillRef>
+            <a:effectRef idx="0">
+              <a:schemeClr val="accent1"/>
+            </a:effectRef>
+            <a:fontRef idx="minor">
+              <a:schemeClr val="tx1"/>
+            </a:fontRef>
+          </p:style>
+        </p:cxnSp>
+        <p:sp>
+          <p:nvSpPr>
+            <p:cNvPr id="9" name="Rectangle 8">
+              <a:extLst>
+                <a:ext uri="{FF2B5EF4-FFF2-40B4-BE49-F238E27FC236}">
+                  <a16:creationId xmlns:a16="http://schemas.microsoft.com/office/drawing/2014/main" id="{8C6B684F-C3ED-49C7-91E5-98AB8D5EC320}"/>
+                </a:ext>
+              </a:extLst>
+            </p:cNvPr>
+            <p:cNvSpPr/>
+            <p:nvPr/>
+          </p:nvSpPr>
+          <p:spPr>
+            <a:xfrm>
+              <a:off x="-1039352" y="-84240"/>
+              <a:ext cx="2877185" cy="4584065"/>
+            </a:xfrm>
+            <a:prstGeom prst="rect">
+              <a:avLst/>
+            </a:prstGeom>
+            <a:noFill/>
+            <a:ln>
+              <a:solidFill>
+                <a:schemeClr val="tx1"/>
+              </a:solidFill>
+            </a:ln>
+          </p:spPr>
+          <p:style>
+            <a:lnRef idx="2">
+              <a:schemeClr val="accent1">
+                <a:shade val="50000"/>
+              </a:schemeClr>
+            </a:lnRef>
+            <a:fillRef idx="1">
+              <a:schemeClr val="accent1"/>
+            </a:fillRef>
+            <a:effectRef idx="0">
+              <a:schemeClr val="accent1"/>
+            </a:effectRef>
+            <a:fontRef idx="minor">
+              <a:schemeClr val="lt1"/>
+            </a:fontRef>
+          </p:style>
+          <p:txBody>
+            <a:bodyPr rtlCol="0" anchor="ctr"/>
+            <a:lstStyle/>
+            <a:p>
+              <a:pPr algn="ctr"/>
+              <a:endParaRPr lang="en-US" dirty="0"/>
+            </a:p>
+          </p:txBody>
+        </p:sp>
+      </p:grpSp>
+      <p:sp>
+        <p:nvSpPr>
+          <p:cNvPr id="10" name="TextBox 63">
+            <a:extLst>
+              <a:ext uri="{FF2B5EF4-FFF2-40B4-BE49-F238E27FC236}">
+                <a16:creationId xmlns:a16="http://schemas.microsoft.com/office/drawing/2014/main" id="{C2B2BE32-17D4-4057-9CCB-943143F8A7FC}"/>
+              </a:ext>
+            </a:extLst>
+          </p:cNvPr>
+          <p:cNvSpPr txBox="1"/>
+          <p:nvPr/>
+        </p:nvSpPr>
+        <p:spPr>
+          <a:xfrm>
+            <a:off x="4554266" y="2899645"/>
+            <a:ext cx="2870835" cy="737235"/>
+          </a:xfrm>
+          <a:prstGeom prst="rect">
+            <a:avLst/>
+          </a:prstGeom>
+          <a:solidFill>
+            <a:srgbClr val="0070C0"/>
+          </a:solidFill>
+          <a:ln w="19050">
+            <a:solidFill>
+              <a:schemeClr val="tx1"/>
+            </a:solidFill>
+          </a:ln>
+        </p:spPr>
+        <p:txBody>
+          <a:bodyPr wrap="square" rtlCol="0">
+            <a:spAutoFit/>
+          </a:bodyPr>
+          <a:lstStyle/>
+          <a:p>
+            <a:pPr algn="ctr"/>
+            <a:r>
+              <a:rPr lang="en-US" sz="1400" dirty="0">
+                <a:sym typeface="+mn-ea"/>
+              </a:rPr>
+              <a:t>Application Image</a:t>
+            </a:r>
+          </a:p>
+          <a:p>
+            <a:pPr algn="ctr"/>
+            <a:endParaRPr lang="en-US" sz="1400" dirty="0">
+              <a:sym typeface="+mn-ea"/>
+            </a:endParaRPr>
+          </a:p>
+          <a:p>
+            <a:pPr algn="ctr"/>
+            <a:r>
+              <a:rPr lang="en-US" sz="1400" dirty="0"/>
+              <a:t>Plaintext</a:t>
+            </a:r>
+          </a:p>
+        </p:txBody>
+      </p:sp>
+      <p:sp>
+        <p:nvSpPr>
+          <p:cNvPr id="12" name="TextBox 63">
+            <a:extLst>
+              <a:ext uri="{FF2B5EF4-FFF2-40B4-BE49-F238E27FC236}">
+                <a16:creationId xmlns:a16="http://schemas.microsoft.com/office/drawing/2014/main" id="{86377966-52AB-4178-939E-D00E3832231D}"/>
+              </a:ext>
+            </a:extLst>
+          </p:cNvPr>
+          <p:cNvSpPr txBox="1"/>
+          <p:nvPr/>
+        </p:nvSpPr>
+        <p:spPr>
+          <a:xfrm>
+            <a:off x="4549186" y="583912"/>
+            <a:ext cx="2870835" cy="523220"/>
+          </a:xfrm>
+          <a:prstGeom prst="rect">
+            <a:avLst/>
+          </a:prstGeom>
+          <a:solidFill>
+            <a:srgbClr val="C19F32"/>
+          </a:solidFill>
+          <a:ln w="19050">
+            <a:solidFill>
+              <a:schemeClr val="tx1"/>
+            </a:solidFill>
+          </a:ln>
+        </p:spPr>
+        <p:txBody>
+          <a:bodyPr wrap="square" rtlCol="0">
+            <a:spAutoFit/>
+          </a:bodyPr>
+          <a:lstStyle/>
+          <a:p>
+            <a:pPr algn="ctr"/>
+            <a:r>
+              <a:rPr lang="en-US" altLang="zh-CN" sz="1400" dirty="0"/>
+              <a:t>Main Boot Record (MBR)</a:t>
+            </a:r>
+            <a:endParaRPr lang="en-US" sz="1400" dirty="0">
+              <a:sym typeface="+mn-ea"/>
+            </a:endParaRPr>
+          </a:p>
+          <a:p>
+            <a:pPr algn="ctr"/>
+            <a:r>
+              <a:rPr lang="en-US" altLang="zh-CN" sz="1400" dirty="0"/>
+              <a:t>Disk Partition Table (DPT)</a:t>
+            </a:r>
+            <a:endParaRPr lang="en-US" sz="1400" dirty="0"/>
           </a:p>
         </p:txBody>
       </p:sp>
@@ -41759,6 +41910,7 @@
       </a:bgFillStyleLst>
     </a:fmtScheme>
   </a:themeElements>
+  <a:objectDefaults/>
   <a:extraClrSchemeLst>
     <a:extraClrScheme>
       <a:clrScheme name="1_Custom Design 1">
@@ -42539,6 +42691,8 @@
       </a:bgFillStyleLst>
     </a:fmtScheme>
   </a:themeElements>
+  <a:objectDefaults/>
+  <a:extraClrSchemeLst/>
   <a:extLst>
     <a:ext uri="{05A4C25C-085E-4340-85A3-A5531E510DB2}">
       <thm15:themeFamily xmlns:thm15="http://schemas.microsoft.com/office/thememl/2012/main" name="Office Theme" id="{62F939B6-93AF-4DB8-9C6B-D6C7DFDC589F}" vid="{4A3C46E8-61CC-4603-A589-7422A47A8E4A}"/>
@@ -42825,6 +42979,8 @@
       </a:bgFillStyleLst>
     </a:fmtScheme>
   </a:themeElements>
+  <a:objectDefaults/>
+  <a:extraClrSchemeLst/>
   <a:extLst>
     <a:ext uri="{05A4C25C-085E-4340-85A3-A5531E510DB2}">
       <thm15:themeFamily xmlns:thm15="http://schemas.microsoft.com/office/thememl/2012/main" name="Office Theme" id="{62F939B6-93AF-4DB8-9C6B-D6C7DFDC589F}" vid="{4A3C46E8-61CC-4603-A589-7422A47A8E4A}"/>

</xml_diff>